<commit_message>
L16 Updated lecture presentation
</commit_message>
<xml_diff>
--- a/Lectures/Lesson 16 - Spring MVC, Spring Boot.pptx
+++ b/Lectures/Lesson 16 - Spring MVC, Spring Boot.pptx
@@ -11685,7 +11685,15 @@
             </a:r>
             <a:r>
               <a:rPr lang="en-GB" dirty="0"/>
-              <a:t> app to Spring Boot autoconfiguration</a:t>
+              <a:t> (both Web </a:t>
+            </a:r>
+            <a:r>
+              <a:rPr lang="en-GB"/>
+              <a:t>and Console) </a:t>
+            </a:r>
+            <a:r>
+              <a:rPr lang="en-GB" dirty="0"/>
+              <a:t>app to Spring Boot autoconfiguration</a:t>
             </a:r>
           </a:p>
           <a:p>
@@ -11717,13 +11725,8 @@
           <a:p>
             <a:r>
               <a:rPr lang="en-GB" dirty="0"/>
-              <a:t>Important note Login/Logout functional should not use </a:t>
+              <a:t>Important note Login/Logout functional should not use Spring Security</a:t>
             </a:r>
-            <a:r>
-              <a:rPr lang="en-GB"/>
-              <a:t>Spring Security</a:t>
-            </a:r>
-            <a:endParaRPr lang="en-GB" dirty="0"/>
           </a:p>
           <a:p>
             <a:endParaRPr lang="en-GB" dirty="0"/>

</xml_diff>